<commit_message>
adding prg cv2, adding quotes, updating icons
</commit_message>
<xml_diff>
--- a/data/prg1/cv2/prg1_cv2.pptx
+++ b/data/prg1/cv2/prg1_cv2.pptx
@@ -106,6 +106,11 @@
       </a:defRPr>
     </a:lvl9pPr>
   </p:defaultTextStyle>
+  <p:extLst>
+    <p:ext uri="{EFAFB233-063F-42B5-8137-9DF3F51BA10A}">
+      <p15:sldGuideLst xmlns:p15="http://schemas.microsoft.com/office/powerpoint/2012/main"/>
+    </p:ext>
+  </p:extLst>
 </p:presentation>
 </file>
 
@@ -7688,6 +7693,13 @@
   <p:clrMapOvr>
     <a:masterClrMapping/>
   </p:clrMapOvr>
+  <p:timing>
+    <p:tnLst>
+      <p:par>
+        <p:cTn id="1" dur="indefinite" restart="never" nodeType="tmRoot"/>
+      </p:par>
+    </p:tnLst>
+  </p:timing>
 </p:sld>
 </file>
 
@@ -7767,8 +7779,23 @@
           <a:p>
             <a:r>
               <a:rPr lang="cs-CZ" dirty="0" smtClean="0"/>
-              <a:t>Správnost (konečnost)</a:t>
-            </a:r>
+              <a:t>Správnost (konečnost</a:t>
+            </a:r>
+            <a:r>
+              <a:rPr lang="cs-CZ" dirty="0" smtClean="0"/>
+              <a:t>)</a:t>
+            </a:r>
+          </a:p>
+          <a:p>
+            <a:r>
+              <a:rPr lang="cs-CZ" dirty="0" smtClean="0"/>
+              <a:t>IS</a:t>
+            </a:r>
+            <a:r>
+              <a:rPr lang="en-US" dirty="0" smtClean="0"/>
+              <a:t>_PRIME()</a:t>
+            </a:r>
+            <a:endParaRPr lang="cs-CZ" dirty="0" smtClean="0"/>
           </a:p>
           <a:p>
             <a:r>
@@ -7781,6 +7808,14 @@
               <a:rPr lang="cs-CZ" dirty="0" smtClean="0"/>
               <a:t>SORT()</a:t>
             </a:r>
+          </a:p>
+          <a:p>
+            <a:pPr lvl="1"/>
+            <a:r>
+              <a:rPr lang="cs-CZ" b="1" dirty="0"/>
+              <a:t>DÚ (středa 17.10.2018)</a:t>
+            </a:r>
+            <a:endParaRPr lang="cs-CZ" dirty="0"/>
           </a:p>
         </p:txBody>
       </p:sp>
@@ -7794,6 +7829,13 @@
   <p:clrMapOvr>
     <a:masterClrMapping/>
   </p:clrMapOvr>
+  <p:timing>
+    <p:tnLst>
+      <p:par>
+        <p:cTn id="1" dur="indefinite" restart="never" nodeType="tmRoot"/>
+      </p:par>
+    </p:tnLst>
+  </p:timing>
 </p:sld>
 </file>
 
@@ -7849,7 +7891,9 @@
         </p:nvSpPr>
         <p:spPr/>
         <p:txBody>
-          <a:bodyPr/>
+          <a:bodyPr>
+            <a:normAutofit fontScale="92500" lnSpcReduction="10000"/>
+          </a:bodyPr>
           <a:lstStyle/>
           <a:p>
             <a:pPr>
@@ -7857,8 +7901,67 @@
               <a:buAutoNum type="arabicPeriod"/>
             </a:pPr>
             <a:r>
+              <a:rPr lang="en-US" dirty="0" err="1" smtClean="0"/>
+              <a:t>Funkce</a:t>
+            </a:r>
+            <a:r>
+              <a:rPr lang="en-US" dirty="0" smtClean="0"/>
+              <a:t> FIND_MIN(x : </a:t>
+            </a:r>
+            <a:r>
+              <a:rPr lang="en-US" dirty="0" err="1" smtClean="0"/>
+              <a:t>int</a:t>
+            </a:r>
+            <a:r>
+              <a:rPr lang="en-US" dirty="0" smtClean="0"/>
+              <a:t>, y : </a:t>
+            </a:r>
+            <a:r>
+              <a:rPr lang="en-US" dirty="0" err="1" smtClean="0"/>
+              <a:t>int</a:t>
+            </a:r>
+            <a:r>
               <a:rPr lang="cs-CZ" dirty="0" smtClean="0"/>
-              <a:t>Kreslení (write(</a:t>
+              <a:t>, z</a:t>
+            </a:r>
+            <a:r>
+              <a:rPr lang="en-US" dirty="0" smtClean="0"/>
+              <a:t> : </a:t>
+            </a:r>
+            <a:r>
+              <a:rPr lang="en-US" dirty="0" err="1" smtClean="0"/>
+              <a:t>int</a:t>
+            </a:r>
+            <a:r>
+              <a:rPr lang="en-US" dirty="0" smtClean="0"/>
+              <a:t>, w : </a:t>
+            </a:r>
+            <a:r>
+              <a:rPr lang="en-US" dirty="0" err="1" smtClean="0"/>
+              <a:t>int</a:t>
+            </a:r>
+            <a:r>
+              <a:rPr lang="en-US" dirty="0" smtClean="0"/>
+              <a:t>)</a:t>
+            </a:r>
+            <a:r>
+              <a:rPr lang="cs-CZ" dirty="0" smtClean="0"/>
+              <a:t> : int</a:t>
+            </a:r>
+            <a:endParaRPr lang="en-US" dirty="0" smtClean="0"/>
+          </a:p>
+          <a:p>
+            <a:pPr>
+              <a:buFont typeface="+mj-lt"/>
+              <a:buAutoNum type="arabicPeriod"/>
+            </a:pPr>
+            <a:r>
+              <a:rPr lang="cs-CZ" dirty="0" smtClean="0"/>
+              <a:t>Kreslení </a:t>
+            </a:r>
+            <a:r>
+              <a:rPr lang="cs-CZ" dirty="0" smtClean="0"/>
+              <a:t>(write(</a:t>
             </a:r>
             <a:r>
               <a:rPr lang="en-US" dirty="0" smtClean="0"/>
@@ -7897,9 +8000,109 @@
               <a:buAutoNum type="arabicPeriod"/>
             </a:pPr>
             <a:r>
+              <a:rPr lang="en-US" dirty="0" smtClean="0"/>
+              <a:t>(</a:t>
+            </a:r>
+            <a:r>
               <a:rPr lang="cs-CZ" dirty="0" smtClean="0"/>
               <a:t>Kruh</a:t>
             </a:r>
+            <a:r>
+              <a:rPr lang="en-US" dirty="0" smtClean="0"/>
+              <a:t>)</a:t>
+            </a:r>
+          </a:p>
+          <a:p>
+            <a:pPr>
+              <a:buFont typeface="+mj-lt"/>
+              <a:buAutoNum type="arabicPeriod"/>
+            </a:pPr>
+            <a:r>
+              <a:rPr lang="cs-CZ" dirty="0" smtClean="0"/>
+              <a:t>Vypsání čísel</a:t>
+            </a:r>
+          </a:p>
+          <a:p>
+            <a:pPr lvl="1">
+              <a:buFont typeface="+mj-lt"/>
+              <a:buAutoNum type="arabicPeriod"/>
+            </a:pPr>
+            <a:r>
+              <a:rPr lang="cs-CZ" dirty="0" smtClean="0"/>
+              <a:t>Čtverec (po/proti směru)</a:t>
+            </a:r>
+          </a:p>
+          <a:p>
+            <a:pPr lvl="1">
+              <a:buFont typeface="+mj-lt"/>
+              <a:buAutoNum type="arabicPeriod"/>
+            </a:pPr>
+            <a:r>
+              <a:rPr lang="cs-CZ" dirty="0" smtClean="0"/>
+              <a:t>Prázdný čtverec</a:t>
+            </a:r>
+            <a:r>
+              <a:rPr lang="cs-CZ" dirty="0"/>
+              <a:t> (po/proti směru</a:t>
+            </a:r>
+            <a:r>
+              <a:rPr lang="cs-CZ" dirty="0" smtClean="0"/>
+              <a:t>)		</a:t>
+            </a:r>
+          </a:p>
+          <a:p>
+            <a:pPr lvl="1">
+              <a:buFont typeface="+mj-lt"/>
+              <a:buAutoNum type="arabicPeriod"/>
+            </a:pPr>
+            <a:r>
+              <a:rPr lang="cs-CZ" dirty="0" smtClean="0"/>
+              <a:t>Trojúhelníky</a:t>
+            </a:r>
+          </a:p>
+          <a:p>
+            <a:pPr lvl="1">
+              <a:buFont typeface="+mj-lt"/>
+              <a:buAutoNum type="arabicPeriod"/>
+            </a:pPr>
+            <a:r>
+              <a:rPr lang="cs-CZ" dirty="0" smtClean="0"/>
+              <a:t>„Fibonnaciho“ trojúhelník</a:t>
+            </a:r>
+            <a:endParaRPr lang="en-US" dirty="0" smtClean="0"/>
+          </a:p>
+          <a:p>
+            <a:pPr>
+              <a:buFont typeface="+mj-lt"/>
+              <a:buAutoNum type="arabicPeriod"/>
+            </a:pPr>
+            <a:r>
+              <a:rPr lang="en-US" dirty="0" smtClean="0"/>
+              <a:t>Snake </a:t>
+            </a:r>
+            <a:r>
+              <a:rPr lang="en-US" dirty="0" err="1" smtClean="0"/>
+              <a:t>kreslen</a:t>
+            </a:r>
+            <a:r>
+              <a:rPr lang="cs-CZ" dirty="0" smtClean="0"/>
+              <a:t>í</a:t>
+            </a:r>
+            <a:r>
+              <a:rPr lang="en-US" dirty="0" smtClean="0"/>
+              <a:t> (</a:t>
+            </a:r>
+            <a:r>
+              <a:rPr lang="cs-CZ" dirty="0" smtClean="0"/>
+              <a:t>viz minulé cvičení)</a:t>
+            </a:r>
+          </a:p>
+          <a:p>
+            <a:pPr lvl="1">
+              <a:buFont typeface="+mj-lt"/>
+              <a:buAutoNum type="arabicPeriod"/>
+            </a:pPr>
+            <a:endParaRPr lang="cs-CZ" dirty="0" smtClean="0"/>
           </a:p>
         </p:txBody>
       </p:sp>
@@ -7913,6 +8116,13 @@
   <p:clrMapOvr>
     <a:masterClrMapping/>
   </p:clrMapOvr>
+  <p:timing>
+    <p:tnLst>
+      <p:par>
+        <p:cTn id="1" dur="indefinite" restart="never" nodeType="tmRoot"/>
+      </p:par>
+    </p:tnLst>
+  </p:timing>
 </p:sld>
 </file>
 

</xml_diff>